<commit_message>
solution for in class activities + slightly revised slides
</commit_message>
<xml_diff>
--- a/ClassMaterials/MapApply/RecursionMapApplyLambdaLet.pptx
+++ b/ClassMaterials/MapApply/RecursionMapApplyLambdaLet.pptx
@@ -173,18 +173,18 @@
   <pc:docChgLst>
     <pc:chgData name="Hewner, Mike" userId="7f3f83dd-6dfb-4127-a87f-c1714bd4fac9" providerId="ADAL" clId="{FEE3980C-739A-4CDF-8748-E558D412C728}"/>
     <pc:docChg chg="custSel addSld delSld modSld">
-      <pc:chgData name="Hewner, Mike" userId="7f3f83dd-6dfb-4127-a87f-c1714bd4fac9" providerId="ADAL" clId="{FEE3980C-739A-4CDF-8748-E558D412C728}" dt="2021-09-09T14:38:57.947" v="291" actId="14100"/>
+      <pc:chgData name="Hewner, Mike" userId="7f3f83dd-6dfb-4127-a87f-c1714bd4fac9" providerId="ADAL" clId="{FEE3980C-739A-4CDF-8748-E558D412C728}" dt="2021-09-09T14:58:38.391" v="296" actId="20577"/>
       <pc:docMkLst>
         <pc:docMk/>
       </pc:docMkLst>
       <pc:sldChg chg="modSp mod">
-        <pc:chgData name="Hewner, Mike" userId="7f3f83dd-6dfb-4127-a87f-c1714bd4fac9" providerId="ADAL" clId="{FEE3980C-739A-4CDF-8748-E558D412C728}" dt="2021-09-09T14:38:57.947" v="291" actId="14100"/>
+        <pc:chgData name="Hewner, Mike" userId="7f3f83dd-6dfb-4127-a87f-c1714bd4fac9" providerId="ADAL" clId="{FEE3980C-739A-4CDF-8748-E558D412C728}" dt="2021-09-09T14:58:38.391" v="296" actId="20577"/>
         <pc:sldMkLst>
           <pc:docMk/>
           <pc:sldMk cId="0" sldId="256"/>
         </pc:sldMkLst>
         <pc:spChg chg="mod">
-          <ac:chgData name="Hewner, Mike" userId="7f3f83dd-6dfb-4127-a87f-c1714bd4fac9" providerId="ADAL" clId="{FEE3980C-739A-4CDF-8748-E558D412C728}" dt="2021-09-09T14:38:57.947" v="291" actId="14100"/>
+          <ac:chgData name="Hewner, Mike" userId="7f3f83dd-6dfb-4127-a87f-c1714bd4fac9" providerId="ADAL" clId="{FEE3980C-739A-4CDF-8748-E558D412C728}" dt="2021-09-09T14:58:38.391" v="296" actId="20577"/>
           <ac:spMkLst>
             <pc:docMk/>
             <pc:sldMk cId="0" sldId="256"/>
@@ -16504,7 +16504,7 @@
           <a:p>
             <a:r>
               <a:rPr lang="en-US" dirty="0"/>
-              <a:t>map filter append</a:t>
+              <a:t>map filter apply</a:t>
             </a:r>
           </a:p>
           <a:p>

</xml_diff>

<commit_message>
minor tweaks to map lecture
</commit_message>
<xml_diff>
--- a/ClassMaterials/MapApply/RecursionMapApplyLambdaLet.pptx
+++ b/ClassMaterials/MapApply/RecursionMapApplyLambdaLet.pptx
@@ -5,22 +5,23 @@
     <p:sldMasterId id="2147483685" r:id="rId1"/>
   </p:sldMasterIdLst>
   <p:notesMasterIdLst>
-    <p:notesMasterId r:id="rId12"/>
+    <p:notesMasterId r:id="rId13"/>
   </p:notesMasterIdLst>
   <p:handoutMasterIdLst>
-    <p:handoutMasterId r:id="rId13"/>
+    <p:handoutMasterId r:id="rId14"/>
   </p:handoutMasterIdLst>
   <p:sldIdLst>
-    <p:sldId id="256" r:id="rId2"/>
-    <p:sldId id="337" r:id="rId3"/>
-    <p:sldId id="356" r:id="rId4"/>
-    <p:sldId id="343" r:id="rId5"/>
-    <p:sldId id="329" r:id="rId6"/>
-    <p:sldId id="318" r:id="rId7"/>
-    <p:sldId id="276" r:id="rId8"/>
-    <p:sldId id="285" r:id="rId9"/>
-    <p:sldId id="286" r:id="rId10"/>
-    <p:sldId id="289" r:id="rId11"/>
+    <p:sldId id="357" r:id="rId2"/>
+    <p:sldId id="256" r:id="rId3"/>
+    <p:sldId id="337" r:id="rId4"/>
+    <p:sldId id="356" r:id="rId5"/>
+    <p:sldId id="343" r:id="rId6"/>
+    <p:sldId id="329" r:id="rId7"/>
+    <p:sldId id="318" r:id="rId8"/>
+    <p:sldId id="276" r:id="rId9"/>
+    <p:sldId id="285" r:id="rId10"/>
+    <p:sldId id="286" r:id="rId11"/>
+    <p:sldId id="289" r:id="rId12"/>
   </p:sldIdLst>
   <p:sldSz cx="9144000" cy="6858000" type="screen4x3"/>
   <p:notesSz cx="6881813" cy="9296400"/>
@@ -367,7 +368,7 @@
             <a:fld id="{03077007-3A73-4E7D-991C-75440D09B976}" type="datetimeFigureOut">
               <a:rPr lang="en-US" smtClean="0"/>
               <a:pPr/>
-              <a:t>9/9/2021</a:t>
+              <a:t>12/5/2022</a:t>
             </a:fld>
             <a:endParaRPr lang="en-US"/>
           </a:p>
@@ -534,7 +535,7 @@
             <a:fld id="{0C12807D-967C-46EC-93C3-FE16C931482B}" type="datetimeFigureOut">
               <a:rPr lang="en-US" smtClean="0"/>
               <a:pPr/>
-              <a:t>9/9/2021</a:t>
+              <a:t>12/5/2022</a:t>
             </a:fld>
             <a:endParaRPr lang="en-US"/>
           </a:p>
@@ -875,7 +876,7 @@
             <a:fld id="{E772BBEE-0ED0-4AF6-8D22-ECE7454DC3FC}" type="slidenum">
               <a:rPr lang="en-US" smtClean="0"/>
               <a:pPr/>
-              <a:t>1</a:t>
+              <a:t>2</a:t>
             </a:fld>
             <a:endParaRPr lang="en-US"/>
           </a:p>
@@ -1101,7 +1102,7 @@
             <a:fld id="{F352D5B2-AE34-4C55-AB6F-517E1ACFB39F}" type="slidenum">
               <a:rPr lang="en-US" smtClean="0"/>
               <a:pPr/>
-              <a:t>2</a:t>
+              <a:t>3</a:t>
             </a:fld>
             <a:endParaRPr lang="en-US"/>
           </a:p>
@@ -1240,7 +1241,7 @@
             <a:fld id="{F352D5B2-AE34-4C55-AB6F-517E1ACFB39F}" type="slidenum">
               <a:rPr lang="en-US" smtClean="0"/>
               <a:pPr/>
-              <a:t>4</a:t>
+              <a:t>5</a:t>
             </a:fld>
             <a:endParaRPr lang="en-US"/>
           </a:p>
@@ -1325,7 +1326,7 @@
             <a:fld id="{E772BBEE-0ED0-4AF6-8D22-ECE7454DC3FC}" type="slidenum">
               <a:rPr lang="en-US" smtClean="0"/>
               <a:pPr/>
-              <a:t>5</a:t>
+              <a:t>6</a:t>
             </a:fld>
             <a:endParaRPr lang="en-US"/>
           </a:p>
@@ -1410,7 +1411,7 @@
             <a:fld id="{E772BBEE-0ED0-4AF6-8D22-ECE7454DC3FC}" type="slidenum">
               <a:rPr lang="en-US" smtClean="0"/>
               <a:pPr/>
-              <a:t>6</a:t>
+              <a:t>7</a:t>
             </a:fld>
             <a:endParaRPr lang="en-US"/>
           </a:p>
@@ -1495,7 +1496,7 @@
             <a:fld id="{E772BBEE-0ED0-4AF6-8D22-ECE7454DC3FC}" type="slidenum">
               <a:rPr lang="en-US" smtClean="0"/>
               <a:pPr/>
-              <a:t>7</a:t>
+              <a:t>8</a:t>
             </a:fld>
             <a:endParaRPr lang="en-US"/>
           </a:p>
@@ -1580,7 +1581,7 @@
             <a:fld id="{E772BBEE-0ED0-4AF6-8D22-ECE7454DC3FC}" type="slidenum">
               <a:rPr lang="en-US" smtClean="0"/>
               <a:pPr/>
-              <a:t>8</a:t>
+              <a:t>9</a:t>
             </a:fld>
             <a:endParaRPr lang="en-US"/>
           </a:p>
@@ -1665,7 +1666,7 @@
             <a:fld id="{E772BBEE-0ED0-4AF6-8D22-ECE7454DC3FC}" type="slidenum">
               <a:rPr lang="en-US" smtClean="0"/>
               <a:pPr/>
-              <a:t>9</a:t>
+              <a:t>10</a:t>
             </a:fld>
             <a:endParaRPr lang="en-US"/>
           </a:p>
@@ -1750,7 +1751,7 @@
             <a:fld id="{E772BBEE-0ED0-4AF6-8D22-ECE7454DC3FC}" type="slidenum">
               <a:rPr lang="en-US" smtClean="0"/>
               <a:pPr/>
-              <a:t>10</a:t>
+              <a:t>11</a:t>
             </a:fld>
             <a:endParaRPr lang="en-US"/>
           </a:p>
@@ -16457,18 +16458,59 @@
       </p:grpSpPr>
       <p:sp>
         <p:nvSpPr>
-          <p:cNvPr id="273410" name="Rectangle 2"/>
+          <p:cNvPr id="2" name="Title 1">
+            <a:extLst>
+              <a:ext uri="{FF2B5EF4-FFF2-40B4-BE49-F238E27FC236}">
+                <a16:creationId xmlns:a16="http://schemas.microsoft.com/office/drawing/2014/main" id="{1B4216AF-4423-F636-A680-808E2FFAC5FE}"/>
+              </a:ext>
+            </a:extLst>
+          </p:cNvPr>
           <p:cNvSpPr>
-            <a:spLocks noGrp="1" noChangeArrowheads="1"/>
+            <a:spLocks noGrp="1"/>
           </p:cNvSpPr>
           <p:nvPr>
-            <p:ph type="ctrTitle"/>
+            <p:ph type="ctrTitle" sz="quarter"/>
+          </p:nvPr>
+        </p:nvSpPr>
+        <p:spPr/>
+        <p:txBody>
+          <a:bodyPr/>
+          <a:lstStyle/>
+          <a:p>
+            <a:r>
+              <a:rPr lang="en-US" dirty="0"/>
+              <a:t>Consider procedure</a:t>
+            </a:r>
+            <a:br>
+              <a:rPr lang="en-US" dirty="0"/>
+            </a:br>
+            <a:r>
+              <a:rPr lang="en-US" dirty="0"/>
+              <a:t>one-even?</a:t>
+            </a:r>
+          </a:p>
+        </p:txBody>
+      </p:sp>
+      <p:sp>
+        <p:nvSpPr>
+          <p:cNvPr id="3" name="Subtitle 2">
+            <a:extLst>
+              <a:ext uri="{FF2B5EF4-FFF2-40B4-BE49-F238E27FC236}">
+                <a16:creationId xmlns:a16="http://schemas.microsoft.com/office/drawing/2014/main" id="{2582DE2A-74D3-C1AB-16B8-46CFB20384AB}"/>
+              </a:ext>
+            </a:extLst>
+          </p:cNvPr>
+          <p:cNvSpPr>
+            <a:spLocks noGrp="1"/>
+          </p:cNvSpPr>
+          <p:nvPr>
+            <p:ph type="subTitle" sz="quarter" idx="1"/>
           </p:nvPr>
         </p:nvSpPr>
         <p:spPr>
           <a:xfrm>
-            <a:off x="457200" y="1692275"/>
-            <a:ext cx="8305800" cy="1736725"/>
+            <a:off x="457200" y="3886200"/>
+            <a:ext cx="8382000" cy="1752600"/>
           </a:xfrm>
         </p:spPr>
         <p:txBody>
@@ -16477,50 +16519,34 @@
           <a:p>
             <a:r>
               <a:rPr lang="en-US" dirty="0"/>
-              <a:t>CSSE 304 Day 4</a:t>
-            </a:r>
-          </a:p>
-        </p:txBody>
-      </p:sp>
-      <p:sp>
-        <p:nvSpPr>
-          <p:cNvPr id="273411" name="Rectangle 3"/>
-          <p:cNvSpPr>
-            <a:spLocks noGrp="1" noChangeArrowheads="1"/>
-          </p:cNvSpPr>
-          <p:nvPr>
-            <p:ph type="subTitle" idx="1"/>
-          </p:nvPr>
-        </p:nvSpPr>
-        <p:spPr>
-          <a:xfrm>
-            <a:off x="152400" y="3886200"/>
-            <a:ext cx="8991600" cy="1752600"/>
-          </a:xfrm>
-        </p:spPr>
-        <p:txBody>
-          <a:bodyPr/>
-          <a:lstStyle/>
-          <a:p>
+              <a:t>Returns true if a list has </a:t>
+            </a:r>
+            <a:r>
+              <a:rPr lang="en-US" i="1" dirty="0"/>
+              <a:t>exactly </a:t>
+            </a:r>
             <a:r>
               <a:rPr lang="en-US" dirty="0"/>
-              <a:t>map filter apply</a:t>
-            </a:r>
+              <a:t>1 even number</a:t>
+            </a:r>
+          </a:p>
+          <a:p>
+            <a:endParaRPr lang="en-US" dirty="0"/>
           </a:p>
           <a:p>
             <a:r>
               <a:rPr lang="en-US" dirty="0"/>
-              <a:t>Functions with variable numbers of </a:t>
-            </a:r>
-            <a:r>
-              <a:rPr lang="en-US" dirty="0" err="1"/>
-              <a:t>args</a:t>
-            </a:r>
-            <a:endParaRPr lang="en-US" dirty="0"/>
+              <a:t>Could you solve this with named let?</a:t>
+            </a:r>
           </a:p>
         </p:txBody>
       </p:sp>
     </p:spTree>
+    <p:extLst>
+      <p:ext uri="{BB962C8B-B14F-4D97-AF65-F5344CB8AC3E}">
+        <p14:creationId xmlns:p14="http://schemas.microsoft.com/office/powerpoint/2010/main" val="2916695169"/>
+      </p:ext>
+    </p:extLst>
   </p:cSld>
   <p:clrMapOvr>
     <a:masterClrMapping/>
@@ -16529,6 +16555,249 @@
 </file>
 
 <file path=ppt/slides/slide10.xml><?xml version="1.0" encoding="utf-8"?>
+<p:sld xmlns:a="http://schemas.openxmlformats.org/drawingml/2006/main" xmlns:r="http://schemas.openxmlformats.org/officeDocument/2006/relationships" xmlns:p="http://schemas.openxmlformats.org/presentationml/2006/main">
+  <p:cSld>
+    <p:spTree>
+      <p:nvGrpSpPr>
+        <p:cNvPr id="1" name=""/>
+        <p:cNvGrpSpPr/>
+        <p:nvPr/>
+      </p:nvGrpSpPr>
+      <p:grpSpPr>
+        <a:xfrm>
+          <a:off x="0" y="0"/>
+          <a:ext cx="0" cy="0"/>
+          <a:chOff x="0" y="0"/>
+          <a:chExt cx="0" cy="0"/>
+        </a:xfrm>
+      </p:grpSpPr>
+      <p:sp>
+        <p:nvSpPr>
+          <p:cNvPr id="311298" name="Rectangle 2"/>
+          <p:cNvSpPr>
+            <a:spLocks noGrp="1" noChangeArrowheads="1"/>
+          </p:cNvSpPr>
+          <p:nvPr>
+            <p:ph type="title"/>
+          </p:nvPr>
+        </p:nvSpPr>
+        <p:spPr/>
+        <p:txBody>
+          <a:bodyPr/>
+          <a:lstStyle/>
+          <a:p>
+            <a:r>
+              <a:rPr lang="en-US" b="1"/>
+              <a:t>lambda</a:t>
+            </a:r>
+            <a:r>
+              <a:rPr lang="en-US"/>
+              <a:t> the magnificent</a:t>
+            </a:r>
+          </a:p>
+        </p:txBody>
+      </p:sp>
+      <p:sp>
+        <p:nvSpPr>
+          <p:cNvPr id="311299" name="Rectangle 3"/>
+          <p:cNvSpPr>
+            <a:spLocks noGrp="1" noChangeArrowheads="1"/>
+          </p:cNvSpPr>
+          <p:nvPr>
+            <p:ph type="body" sz="half" idx="1"/>
+          </p:nvPr>
+        </p:nvSpPr>
+        <p:spPr>
+          <a:xfrm>
+            <a:off x="457200" y="1219200"/>
+            <a:ext cx="7924800" cy="1447800"/>
+          </a:xfrm>
+        </p:spPr>
+        <p:txBody>
+          <a:bodyPr/>
+          <a:lstStyle/>
+          <a:p>
+            <a:r>
+              <a:rPr lang="en-US" dirty="0"/>
+              <a:t>We can create a new procedure and return it. </a:t>
+            </a:r>
+          </a:p>
+        </p:txBody>
+      </p:sp>
+      <p:pic>
+        <p:nvPicPr>
+          <p:cNvPr id="311302" name="Picture 6"/>
+          <p:cNvPicPr>
+            <a:picLocks noGrp="1" noChangeAspect="1" noChangeArrowheads="1"/>
+          </p:cNvPicPr>
+          <p:nvPr>
+            <p:ph sz="half" idx="2"/>
+          </p:nvPr>
+        </p:nvPicPr>
+        <p:blipFill>
+          <a:blip r:embed="rId3" cstate="print"/>
+          <a:srcRect/>
+          <a:stretch>
+            <a:fillRect/>
+          </a:stretch>
+        </p:blipFill>
+        <p:spPr>
+          <a:xfrm>
+            <a:off x="685800" y="2362200"/>
+            <a:ext cx="8458200" cy="3051175"/>
+          </a:xfrm>
+          <a:noFill/>
+          <a:ln/>
+        </p:spPr>
+      </p:pic>
+      <p:sp>
+        <p:nvSpPr>
+          <p:cNvPr id="311304" name="Rectangle 8"/>
+          <p:cNvSpPr>
+            <a:spLocks noChangeArrowheads="1"/>
+          </p:cNvSpPr>
+          <p:nvPr/>
+        </p:nvSpPr>
+        <p:spPr bwMode="auto">
+          <a:xfrm>
+            <a:off x="533400" y="5410200"/>
+            <a:ext cx="7924800" cy="1447800"/>
+          </a:xfrm>
+          <a:prstGeom prst="rect">
+            <a:avLst/>
+          </a:prstGeom>
+          <a:noFill/>
+          <a:ln w="9525">
+            <a:noFill/>
+            <a:miter lim="800000"/>
+            <a:headEnd/>
+            <a:tailEnd/>
+          </a:ln>
+          <a:effectLst/>
+        </p:spPr>
+        <p:txBody>
+          <a:bodyPr/>
+          <a:lstStyle/>
+          <a:p>
+            <a:pPr marL="342900" indent="-342900" eaLnBrk="1" hangingPunct="1">
+              <a:spcBef>
+                <a:spcPct val="20000"/>
+              </a:spcBef>
+              <a:buClr>
+                <a:schemeClr val="hlink"/>
+              </a:buClr>
+              <a:buSzPct val="60000"/>
+              <a:buFont typeface="Wingdings" pitchFamily="2" charset="2"/>
+              <a:buChar char="n"/>
+            </a:pPr>
+            <a:r>
+              <a:rPr lang="en-US" sz="3200">
+                <a:effectLst>
+                  <a:outerShdw blurRad="38100" dist="38100" dir="2700000" algn="tl">
+                    <a:srgbClr val="000000"/>
+                  </a:outerShdw>
+                </a:effectLst>
+              </a:rPr>
+              <a:t>Scheme is not the only language with first-class procedures …  </a:t>
+            </a:r>
+          </a:p>
+        </p:txBody>
+      </p:sp>
+    </p:spTree>
+  </p:cSld>
+  <p:clrMapOvr>
+    <a:masterClrMapping/>
+  </p:clrMapOvr>
+  <p:timing>
+    <p:tnLst>
+      <p:par>
+        <p:cTn id="1" dur="indefinite" restart="never" nodeType="tmRoot">
+          <p:childTnLst>
+            <p:seq concurrent="1" nextAc="seek">
+              <p:cTn id="2" dur="indefinite" nodeType="mainSeq">
+                <p:childTnLst>
+                  <p:par>
+                    <p:cTn id="3" fill="hold">
+                      <p:stCondLst>
+                        <p:cond delay="indefinite"/>
+                      </p:stCondLst>
+                      <p:childTnLst>
+                        <p:par>
+                          <p:cTn id="4" fill="hold">
+                            <p:stCondLst>
+                              <p:cond delay="0"/>
+                            </p:stCondLst>
+                            <p:childTnLst>
+                              <p:par>
+                                <p:cTn id="5" presetID="9" presetClass="entr" presetSubtype="0" fill="hold" grpId="0" nodeType="clickEffect">
+                                  <p:stCondLst>
+                                    <p:cond delay="0"/>
+                                  </p:stCondLst>
+                                  <p:childTnLst>
+                                    <p:set>
+                                      <p:cBhvr>
+                                        <p:cTn id="6" dur="1" fill="hold">
+                                          <p:stCondLst>
+                                            <p:cond delay="0"/>
+                                          </p:stCondLst>
+                                        </p:cTn>
+                                        <p:tgtEl>
+                                          <p:spTgt spid="311304"/>
+                                        </p:tgtEl>
+                                        <p:attrNameLst>
+                                          <p:attrName>style.visibility</p:attrName>
+                                        </p:attrNameLst>
+                                      </p:cBhvr>
+                                      <p:to>
+                                        <p:strVal val="visible"/>
+                                      </p:to>
+                                    </p:set>
+                                    <p:animEffect transition="in" filter="dissolve">
+                                      <p:cBhvr>
+                                        <p:cTn id="7" dur="500"/>
+                                        <p:tgtEl>
+                                          <p:spTgt spid="311304"/>
+                                        </p:tgtEl>
+                                      </p:cBhvr>
+                                    </p:animEffect>
+                                  </p:childTnLst>
+                                </p:cTn>
+                              </p:par>
+                            </p:childTnLst>
+                          </p:cTn>
+                        </p:par>
+                      </p:childTnLst>
+                    </p:cTn>
+                  </p:par>
+                </p:childTnLst>
+              </p:cTn>
+              <p:prevCondLst>
+                <p:cond evt="onPrev" delay="0">
+                  <p:tgtEl>
+                    <p:sldTgt/>
+                  </p:tgtEl>
+                </p:cond>
+              </p:prevCondLst>
+              <p:nextCondLst>
+                <p:cond evt="onNext" delay="0">
+                  <p:tgtEl>
+                    <p:sldTgt/>
+                  </p:tgtEl>
+                </p:cond>
+              </p:nextCondLst>
+            </p:seq>
+          </p:childTnLst>
+        </p:cTn>
+      </p:par>
+    </p:tnLst>
+    <p:bldLst>
+      <p:bldP spid="311304" grpId="0"/>
+    </p:bldLst>
+  </p:timing>
+</p:sld>
+</file>
+
+<file path=ppt/slides/slide11.xml><?xml version="1.0" encoding="utf-8"?>
 <p:sld xmlns:a="http://schemas.openxmlformats.org/drawingml/2006/main" xmlns:r="http://schemas.openxmlformats.org/officeDocument/2006/relationships" xmlns:p="http://schemas.openxmlformats.org/presentationml/2006/main">
   <p:cSld>
     <p:spTree>
@@ -16645,6 +16914,96 @@
 </file>
 
 <file path=ppt/slides/slide2.xml><?xml version="1.0" encoding="utf-8"?>
+<p:sld xmlns:a="http://schemas.openxmlformats.org/drawingml/2006/main" xmlns:r="http://schemas.openxmlformats.org/officeDocument/2006/relationships" xmlns:p="http://schemas.openxmlformats.org/presentationml/2006/main">
+  <p:cSld>
+    <p:spTree>
+      <p:nvGrpSpPr>
+        <p:cNvPr id="1" name=""/>
+        <p:cNvGrpSpPr/>
+        <p:nvPr/>
+      </p:nvGrpSpPr>
+      <p:grpSpPr>
+        <a:xfrm>
+          <a:off x="0" y="0"/>
+          <a:ext cx="0" cy="0"/>
+          <a:chOff x="0" y="0"/>
+          <a:chExt cx="0" cy="0"/>
+        </a:xfrm>
+      </p:grpSpPr>
+      <p:sp>
+        <p:nvSpPr>
+          <p:cNvPr id="273410" name="Rectangle 2"/>
+          <p:cNvSpPr>
+            <a:spLocks noGrp="1" noChangeArrowheads="1"/>
+          </p:cNvSpPr>
+          <p:nvPr>
+            <p:ph type="ctrTitle"/>
+          </p:nvPr>
+        </p:nvSpPr>
+        <p:spPr>
+          <a:xfrm>
+            <a:off x="457200" y="1692275"/>
+            <a:ext cx="8305800" cy="1736725"/>
+          </a:xfrm>
+        </p:spPr>
+        <p:txBody>
+          <a:bodyPr/>
+          <a:lstStyle/>
+          <a:p>
+            <a:r>
+              <a:rPr lang="en-US" dirty="0"/>
+              <a:t>CSSE 304 Day 4</a:t>
+            </a:r>
+          </a:p>
+        </p:txBody>
+      </p:sp>
+      <p:sp>
+        <p:nvSpPr>
+          <p:cNvPr id="273411" name="Rectangle 3"/>
+          <p:cNvSpPr>
+            <a:spLocks noGrp="1" noChangeArrowheads="1"/>
+          </p:cNvSpPr>
+          <p:nvPr>
+            <p:ph type="subTitle" idx="1"/>
+          </p:nvPr>
+        </p:nvSpPr>
+        <p:spPr>
+          <a:xfrm>
+            <a:off x="152400" y="3886200"/>
+            <a:ext cx="8991600" cy="1752600"/>
+          </a:xfrm>
+        </p:spPr>
+        <p:txBody>
+          <a:bodyPr/>
+          <a:lstStyle/>
+          <a:p>
+            <a:r>
+              <a:rPr lang="en-US" dirty="0"/>
+              <a:t>map filter apply</a:t>
+            </a:r>
+          </a:p>
+          <a:p>
+            <a:r>
+              <a:rPr lang="en-US" dirty="0"/>
+              <a:t>Functions with variable numbers of </a:t>
+            </a:r>
+            <a:r>
+              <a:rPr lang="en-US" dirty="0" err="1"/>
+              <a:t>args</a:t>
+            </a:r>
+            <a:endParaRPr lang="en-US" dirty="0"/>
+          </a:p>
+        </p:txBody>
+      </p:sp>
+    </p:spTree>
+  </p:cSld>
+  <p:clrMapOvr>
+    <a:masterClrMapping/>
+  </p:clrMapOvr>
+</p:sld>
+</file>
+
+<file path=ppt/slides/slide3.xml><?xml version="1.0" encoding="utf-8"?>
 <p:sld xmlns:a="http://schemas.openxmlformats.org/drawingml/2006/main" xmlns:r="http://schemas.openxmlformats.org/officeDocument/2006/relationships" xmlns:p="http://schemas.openxmlformats.org/presentationml/2006/main">
   <p:cSld>
     <p:spTree>
@@ -16915,7 +17274,7 @@
 </p:sld>
 </file>
 
-<file path=ppt/slides/slide3.xml><?xml version="1.0" encoding="utf-8"?>
+<file path=ppt/slides/slide4.xml><?xml version="1.0" encoding="utf-8"?>
 <p:sld xmlns:a="http://schemas.openxmlformats.org/drawingml/2006/main" xmlns:r="http://schemas.openxmlformats.org/officeDocument/2006/relationships" xmlns:p="http://schemas.openxmlformats.org/presentationml/2006/main">
   <p:cSld>
     <p:spTree>
@@ -17001,7 +17360,7 @@
 </p:sld>
 </file>
 
-<file path=ppt/slides/slide4.xml><?xml version="1.0" encoding="utf-8"?>
+<file path=ppt/slides/slide5.xml><?xml version="1.0" encoding="utf-8"?>
 <p:sld xmlns:a="http://schemas.openxmlformats.org/drawingml/2006/main" xmlns:r="http://schemas.openxmlformats.org/officeDocument/2006/relationships" xmlns:p="http://schemas.openxmlformats.org/presentationml/2006/main" showMasterPhAnim="0">
   <p:cSld>
     <p:spTree>
@@ -17690,7 +18049,7 @@
 </p:sld>
 </file>
 
-<file path=ppt/slides/slide5.xml><?xml version="1.0" encoding="utf-8"?>
+<file path=ppt/slides/slide6.xml><?xml version="1.0" encoding="utf-8"?>
 <p:sld xmlns:a="http://schemas.openxmlformats.org/drawingml/2006/main" xmlns:r="http://schemas.openxmlformats.org/officeDocument/2006/relationships" xmlns:p="http://schemas.openxmlformats.org/presentationml/2006/main">
   <p:cSld>
     <p:spTree>
@@ -18381,7 +18740,7 @@
 </p:sld>
 </file>
 
-<file path=ppt/slides/slide6.xml><?xml version="1.0" encoding="utf-8"?>
+<file path=ppt/slides/slide7.xml><?xml version="1.0" encoding="utf-8"?>
 <p:sld xmlns:a="http://schemas.openxmlformats.org/drawingml/2006/main" xmlns:r="http://schemas.openxmlformats.org/officeDocument/2006/relationships" xmlns:p="http://schemas.openxmlformats.org/presentationml/2006/main">
   <p:cSld>
     <p:spTree>
@@ -18509,7 +18868,7 @@
 </p:sld>
 </file>
 
-<file path=ppt/slides/slide7.xml><?xml version="1.0" encoding="utf-8"?>
+<file path=ppt/slides/slide8.xml><?xml version="1.0" encoding="utf-8"?>
 <p:sld xmlns:a="http://schemas.openxmlformats.org/drawingml/2006/main" xmlns:r="http://schemas.openxmlformats.org/officeDocument/2006/relationships" xmlns:p="http://schemas.openxmlformats.org/presentationml/2006/main">
   <p:cSld>
     <p:spTree>
@@ -18686,7 +19045,7 @@
 </p:sld>
 </file>
 
-<file path=ppt/slides/slide8.xml><?xml version="1.0" encoding="utf-8"?>
+<file path=ppt/slides/slide9.xml><?xml version="1.0" encoding="utf-8"?>
 <p:sld xmlns:a="http://schemas.openxmlformats.org/drawingml/2006/main" xmlns:r="http://schemas.openxmlformats.org/officeDocument/2006/relationships" xmlns:p="http://schemas.openxmlformats.org/presentationml/2006/main">
   <p:cSld>
     <p:spTree>
@@ -18787,249 +19146,6 @@
   <p:clrMapOvr>
     <a:masterClrMapping/>
   </p:clrMapOvr>
-</p:sld>
-</file>
-
-<file path=ppt/slides/slide9.xml><?xml version="1.0" encoding="utf-8"?>
-<p:sld xmlns:a="http://schemas.openxmlformats.org/drawingml/2006/main" xmlns:r="http://schemas.openxmlformats.org/officeDocument/2006/relationships" xmlns:p="http://schemas.openxmlformats.org/presentationml/2006/main">
-  <p:cSld>
-    <p:spTree>
-      <p:nvGrpSpPr>
-        <p:cNvPr id="1" name=""/>
-        <p:cNvGrpSpPr/>
-        <p:nvPr/>
-      </p:nvGrpSpPr>
-      <p:grpSpPr>
-        <a:xfrm>
-          <a:off x="0" y="0"/>
-          <a:ext cx="0" cy="0"/>
-          <a:chOff x="0" y="0"/>
-          <a:chExt cx="0" cy="0"/>
-        </a:xfrm>
-      </p:grpSpPr>
-      <p:sp>
-        <p:nvSpPr>
-          <p:cNvPr id="311298" name="Rectangle 2"/>
-          <p:cNvSpPr>
-            <a:spLocks noGrp="1" noChangeArrowheads="1"/>
-          </p:cNvSpPr>
-          <p:nvPr>
-            <p:ph type="title"/>
-          </p:nvPr>
-        </p:nvSpPr>
-        <p:spPr/>
-        <p:txBody>
-          <a:bodyPr/>
-          <a:lstStyle/>
-          <a:p>
-            <a:r>
-              <a:rPr lang="en-US" b="1"/>
-              <a:t>lambda</a:t>
-            </a:r>
-            <a:r>
-              <a:rPr lang="en-US"/>
-              <a:t> the magnificent</a:t>
-            </a:r>
-          </a:p>
-        </p:txBody>
-      </p:sp>
-      <p:sp>
-        <p:nvSpPr>
-          <p:cNvPr id="311299" name="Rectangle 3"/>
-          <p:cNvSpPr>
-            <a:spLocks noGrp="1" noChangeArrowheads="1"/>
-          </p:cNvSpPr>
-          <p:nvPr>
-            <p:ph type="body" sz="half" idx="1"/>
-          </p:nvPr>
-        </p:nvSpPr>
-        <p:spPr>
-          <a:xfrm>
-            <a:off x="457200" y="1219200"/>
-            <a:ext cx="7924800" cy="1447800"/>
-          </a:xfrm>
-        </p:spPr>
-        <p:txBody>
-          <a:bodyPr/>
-          <a:lstStyle/>
-          <a:p>
-            <a:r>
-              <a:rPr lang="en-US" dirty="0"/>
-              <a:t>We can create a new procedure and return it. </a:t>
-            </a:r>
-          </a:p>
-        </p:txBody>
-      </p:sp>
-      <p:pic>
-        <p:nvPicPr>
-          <p:cNvPr id="311302" name="Picture 6"/>
-          <p:cNvPicPr>
-            <a:picLocks noGrp="1" noChangeAspect="1" noChangeArrowheads="1"/>
-          </p:cNvPicPr>
-          <p:nvPr>
-            <p:ph sz="half" idx="2"/>
-          </p:nvPr>
-        </p:nvPicPr>
-        <p:blipFill>
-          <a:blip r:embed="rId3" cstate="print"/>
-          <a:srcRect/>
-          <a:stretch>
-            <a:fillRect/>
-          </a:stretch>
-        </p:blipFill>
-        <p:spPr>
-          <a:xfrm>
-            <a:off x="685800" y="2362200"/>
-            <a:ext cx="8458200" cy="3051175"/>
-          </a:xfrm>
-          <a:noFill/>
-          <a:ln/>
-        </p:spPr>
-      </p:pic>
-      <p:sp>
-        <p:nvSpPr>
-          <p:cNvPr id="311304" name="Rectangle 8"/>
-          <p:cNvSpPr>
-            <a:spLocks noChangeArrowheads="1"/>
-          </p:cNvSpPr>
-          <p:nvPr/>
-        </p:nvSpPr>
-        <p:spPr bwMode="auto">
-          <a:xfrm>
-            <a:off x="533400" y="5410200"/>
-            <a:ext cx="7924800" cy="1447800"/>
-          </a:xfrm>
-          <a:prstGeom prst="rect">
-            <a:avLst/>
-          </a:prstGeom>
-          <a:noFill/>
-          <a:ln w="9525">
-            <a:noFill/>
-            <a:miter lim="800000"/>
-            <a:headEnd/>
-            <a:tailEnd/>
-          </a:ln>
-          <a:effectLst/>
-        </p:spPr>
-        <p:txBody>
-          <a:bodyPr/>
-          <a:lstStyle/>
-          <a:p>
-            <a:pPr marL="342900" indent="-342900" eaLnBrk="1" hangingPunct="1">
-              <a:spcBef>
-                <a:spcPct val="20000"/>
-              </a:spcBef>
-              <a:buClr>
-                <a:schemeClr val="hlink"/>
-              </a:buClr>
-              <a:buSzPct val="60000"/>
-              <a:buFont typeface="Wingdings" pitchFamily="2" charset="2"/>
-              <a:buChar char="n"/>
-            </a:pPr>
-            <a:r>
-              <a:rPr lang="en-US" sz="3200">
-                <a:effectLst>
-                  <a:outerShdw blurRad="38100" dist="38100" dir="2700000" algn="tl">
-                    <a:srgbClr val="000000"/>
-                  </a:outerShdw>
-                </a:effectLst>
-              </a:rPr>
-              <a:t>Scheme is not the only language with first-class procedures …  </a:t>
-            </a:r>
-          </a:p>
-        </p:txBody>
-      </p:sp>
-    </p:spTree>
-  </p:cSld>
-  <p:clrMapOvr>
-    <a:masterClrMapping/>
-  </p:clrMapOvr>
-  <p:timing>
-    <p:tnLst>
-      <p:par>
-        <p:cTn id="1" dur="indefinite" restart="never" nodeType="tmRoot">
-          <p:childTnLst>
-            <p:seq concurrent="1" nextAc="seek">
-              <p:cTn id="2" dur="indefinite" nodeType="mainSeq">
-                <p:childTnLst>
-                  <p:par>
-                    <p:cTn id="3" fill="hold">
-                      <p:stCondLst>
-                        <p:cond delay="indefinite"/>
-                      </p:stCondLst>
-                      <p:childTnLst>
-                        <p:par>
-                          <p:cTn id="4" fill="hold">
-                            <p:stCondLst>
-                              <p:cond delay="0"/>
-                            </p:stCondLst>
-                            <p:childTnLst>
-                              <p:par>
-                                <p:cTn id="5" presetID="9" presetClass="entr" presetSubtype="0" fill="hold" grpId="0" nodeType="clickEffect">
-                                  <p:stCondLst>
-                                    <p:cond delay="0"/>
-                                  </p:stCondLst>
-                                  <p:childTnLst>
-                                    <p:set>
-                                      <p:cBhvr>
-                                        <p:cTn id="6" dur="1" fill="hold">
-                                          <p:stCondLst>
-                                            <p:cond delay="0"/>
-                                          </p:stCondLst>
-                                        </p:cTn>
-                                        <p:tgtEl>
-                                          <p:spTgt spid="311304"/>
-                                        </p:tgtEl>
-                                        <p:attrNameLst>
-                                          <p:attrName>style.visibility</p:attrName>
-                                        </p:attrNameLst>
-                                      </p:cBhvr>
-                                      <p:to>
-                                        <p:strVal val="visible"/>
-                                      </p:to>
-                                    </p:set>
-                                    <p:animEffect transition="in" filter="dissolve">
-                                      <p:cBhvr>
-                                        <p:cTn id="7" dur="500"/>
-                                        <p:tgtEl>
-                                          <p:spTgt spid="311304"/>
-                                        </p:tgtEl>
-                                      </p:cBhvr>
-                                    </p:animEffect>
-                                  </p:childTnLst>
-                                </p:cTn>
-                              </p:par>
-                            </p:childTnLst>
-                          </p:cTn>
-                        </p:par>
-                      </p:childTnLst>
-                    </p:cTn>
-                  </p:par>
-                </p:childTnLst>
-              </p:cTn>
-              <p:prevCondLst>
-                <p:cond evt="onPrev" delay="0">
-                  <p:tgtEl>
-                    <p:sldTgt/>
-                  </p:tgtEl>
-                </p:cond>
-              </p:prevCondLst>
-              <p:nextCondLst>
-                <p:cond evt="onNext" delay="0">
-                  <p:tgtEl>
-                    <p:sldTgt/>
-                  </p:tgtEl>
-                </p:cond>
-              </p:nextCondLst>
-            </p:seq>
-          </p:childTnLst>
-        </p:cTn>
-      </p:par>
-    </p:tnLst>
-    <p:bldLst>
-      <p:bldP spid="311304" grpId="0"/>
-    </p:bldLst>
-  </p:timing>
 </p:sld>
 </file>
 

</xml_diff>